<commit_message>
changes from Alex almost abstract submit
</commit_message>
<xml_diff>
--- a/ASE15/paper/TestFlow.pptx
+++ b/ASE15/paper/TestFlow.pptx
@@ -5,7 +5,7 @@
     <p:sldMasterId id="2147483648" r:id="rId1"/>
   </p:sldMasterIdLst>
   <p:sldIdLst>
-    <p:sldId id="256" r:id="rId2"/>
+    <p:sldId id="257" r:id="rId2"/>
   </p:sldIdLst>
   <p:sldSz cx="9144000" cy="6858000" type="screen4x3"/>
   <p:notesSz cx="6858000" cy="9144000"/>
@@ -289,7 +289,7 @@
             <a:fld id="{385C14C5-1CFE-4911-8CD9-CC6FA2EA80E0}" type="datetimeFigureOut">
               <a:rPr lang="en-US" smtClean="0"/>
               <a:pPr/>
-              <a:t>7/14/2009</a:t>
+              <a:t>5/5/15</a:t>
             </a:fld>
             <a:endParaRPr lang="en-US"/>
           </a:p>
@@ -456,7 +456,7 @@
             <a:fld id="{385C14C5-1CFE-4911-8CD9-CC6FA2EA80E0}" type="datetimeFigureOut">
               <a:rPr lang="en-US" smtClean="0"/>
               <a:pPr/>
-              <a:t>7/14/2009</a:t>
+              <a:t>5/5/15</a:t>
             </a:fld>
             <a:endParaRPr lang="en-US"/>
           </a:p>
@@ -633,7 +633,7 @@
             <a:fld id="{385C14C5-1CFE-4911-8CD9-CC6FA2EA80E0}" type="datetimeFigureOut">
               <a:rPr lang="en-US" smtClean="0"/>
               <a:pPr/>
-              <a:t>7/14/2009</a:t>
+              <a:t>5/5/15</a:t>
             </a:fld>
             <a:endParaRPr lang="en-US"/>
           </a:p>
@@ -800,7 +800,7 @@
             <a:fld id="{385C14C5-1CFE-4911-8CD9-CC6FA2EA80E0}" type="datetimeFigureOut">
               <a:rPr lang="en-US" smtClean="0"/>
               <a:pPr/>
-              <a:t>7/14/2009</a:t>
+              <a:t>5/5/15</a:t>
             </a:fld>
             <a:endParaRPr lang="en-US"/>
           </a:p>
@@ -1043,7 +1043,7 @@
             <a:fld id="{385C14C5-1CFE-4911-8CD9-CC6FA2EA80E0}" type="datetimeFigureOut">
               <a:rPr lang="en-US" smtClean="0"/>
               <a:pPr/>
-              <a:t>7/14/2009</a:t>
+              <a:t>5/5/15</a:t>
             </a:fld>
             <a:endParaRPr lang="en-US"/>
           </a:p>
@@ -1328,7 +1328,7 @@
             <a:fld id="{385C14C5-1CFE-4911-8CD9-CC6FA2EA80E0}" type="datetimeFigureOut">
               <a:rPr lang="en-US" smtClean="0"/>
               <a:pPr/>
-              <a:t>7/14/2009</a:t>
+              <a:t>5/5/15</a:t>
             </a:fld>
             <a:endParaRPr lang="en-US"/>
           </a:p>
@@ -1747,7 +1747,7 @@
             <a:fld id="{385C14C5-1CFE-4911-8CD9-CC6FA2EA80E0}" type="datetimeFigureOut">
               <a:rPr lang="en-US" smtClean="0"/>
               <a:pPr/>
-              <a:t>7/14/2009</a:t>
+              <a:t>5/5/15</a:t>
             </a:fld>
             <a:endParaRPr lang="en-US"/>
           </a:p>
@@ -1862,7 +1862,7 @@
             <a:fld id="{385C14C5-1CFE-4911-8CD9-CC6FA2EA80E0}" type="datetimeFigureOut">
               <a:rPr lang="en-US" smtClean="0"/>
               <a:pPr/>
-              <a:t>7/14/2009</a:t>
+              <a:t>5/5/15</a:t>
             </a:fld>
             <a:endParaRPr lang="en-US"/>
           </a:p>
@@ -1954,7 +1954,7 @@
             <a:fld id="{385C14C5-1CFE-4911-8CD9-CC6FA2EA80E0}" type="datetimeFigureOut">
               <a:rPr lang="en-US" smtClean="0"/>
               <a:pPr/>
-              <a:t>7/14/2009</a:t>
+              <a:t>5/5/15</a:t>
             </a:fld>
             <a:endParaRPr lang="en-US"/>
           </a:p>
@@ -2228,7 +2228,7 @@
             <a:fld id="{385C14C5-1CFE-4911-8CD9-CC6FA2EA80E0}" type="datetimeFigureOut">
               <a:rPr lang="en-US" smtClean="0"/>
               <a:pPr/>
-              <a:t>7/14/2009</a:t>
+              <a:t>5/5/15</a:t>
             </a:fld>
             <a:endParaRPr lang="en-US"/>
           </a:p>
@@ -2478,7 +2478,7 @@
             <a:fld id="{385C14C5-1CFE-4911-8CD9-CC6FA2EA80E0}" type="datetimeFigureOut">
               <a:rPr lang="en-US" smtClean="0"/>
               <a:pPr/>
-              <a:t>7/14/2009</a:t>
+              <a:t>5/5/15</a:t>
             </a:fld>
             <a:endParaRPr lang="en-US"/>
           </a:p>
@@ -2688,7 +2688,7 @@
             <a:fld id="{385C14C5-1CFE-4911-8CD9-CC6FA2EA80E0}" type="datetimeFigureOut">
               <a:rPr lang="en-US" smtClean="0"/>
               <a:pPr/>
-              <a:t>7/14/2009</a:t>
+              <a:t>5/5/15</a:t>
             </a:fld>
             <a:endParaRPr lang="en-US"/>
           </a:p>
@@ -3067,15 +3067,19 @@
         </p:nvSpPr>
         <p:spPr>
           <a:xfrm>
-            <a:off x="1125274" y="1371600"/>
+            <a:off x="1752600" y="838200"/>
             <a:ext cx="1676400" cy="762000"/>
           </a:xfrm>
           <a:prstGeom prst="rect">
             <a:avLst/>
           </a:prstGeom>
           <a:solidFill>
-            <a:srgbClr val="00B0F0"/>
+            <a:schemeClr val="tx2">
+              <a:lumMod val="40000"/>
+              <a:lumOff val="60000"/>
+            </a:schemeClr>
           </a:solidFill>
+          <a:ln w="38100"/>
         </p:spPr>
         <p:style>
           <a:lnRef idx="2">
@@ -3100,7 +3104,18 @@
             <a:pPr algn="ctr"/>
             <a:r>
               <a:rPr lang="en-US" dirty="0" smtClean="0"/>
-              <a:t>SUT</a:t>
+              <a:t>Model</a:t>
+            </a:r>
+          </a:p>
+          <a:p>
+            <a:pPr algn="ctr"/>
+            <a:r>
+              <a:rPr lang="en-US" dirty="0"/>
+              <a:t>c</a:t>
+            </a:r>
+            <a:r>
+              <a:rPr lang="en-US" dirty="0" smtClean="0"/>
+              <a:t>hecker</a:t>
             </a:r>
             <a:endParaRPr lang="en-US" dirty="0"/>
           </a:p>
@@ -3114,7 +3129,7 @@
         </p:nvSpPr>
         <p:spPr>
           <a:xfrm>
-            <a:off x="1125274" y="3401007"/>
+            <a:off x="2438400" y="2743200"/>
             <a:ext cx="1676400" cy="762000"/>
           </a:xfrm>
           <a:prstGeom prst="rect">
@@ -3147,30 +3162,148 @@
             <a:pPr algn="ctr"/>
             <a:r>
               <a:rPr lang="en-US" dirty="0" smtClean="0"/>
-              <a:t>Model checking harness</a:t>
+              <a:t>Harness</a:t>
             </a:r>
             <a:endParaRPr lang="en-US" dirty="0"/>
           </a:p>
         </p:txBody>
       </p:sp>
-      <p:sp>
-        <p:nvSpPr>
-          <p:cNvPr id="6" name="Oval 5"/>
+      <p:cxnSp>
+        <p:nvCxnSpPr>
+          <p:cNvPr id="26" name="Straight Arrow Connector 25"/>
+          <p:cNvCxnSpPr/>
+          <p:nvPr/>
+        </p:nvCxnSpPr>
+        <p:spPr>
+          <a:xfrm>
+            <a:off x="2209800" y="1752600"/>
+            <a:ext cx="152400" cy="1219200"/>
+          </a:xfrm>
+          <a:prstGeom prst="straightConnector1">
+            <a:avLst/>
+          </a:prstGeom>
+          <a:ln>
+            <a:headEnd type="triangle" w="lg" len="lg"/>
+            <a:tailEnd type="none"/>
+          </a:ln>
+        </p:spPr>
+        <p:style>
+          <a:lnRef idx="1">
+            <a:schemeClr val="accent1"/>
+          </a:lnRef>
+          <a:fillRef idx="0">
+            <a:schemeClr val="accent1"/>
+          </a:fillRef>
+          <a:effectRef idx="0">
+            <a:schemeClr val="accent1"/>
+          </a:effectRef>
+          <a:fontRef idx="minor">
+            <a:schemeClr val="tx1"/>
+          </a:fontRef>
+        </p:style>
+      </p:cxnSp>
+      <p:sp>
+        <p:nvSpPr>
+          <p:cNvPr id="32" name="TextBox 31"/>
+          <p:cNvSpPr txBox="1"/>
+          <p:nvPr/>
+        </p:nvSpPr>
+        <p:spPr>
+          <a:xfrm>
+            <a:off x="980967" y="5562600"/>
+            <a:ext cx="2295633" cy="646331"/>
+          </a:xfrm>
+          <a:prstGeom prst="rect">
+            <a:avLst/>
+          </a:prstGeom>
+          <a:noFill/>
+        </p:spPr>
+        <p:txBody>
+          <a:bodyPr wrap="none" rtlCol="0">
+            <a:spAutoFit/>
+          </a:bodyPr>
+          <a:lstStyle/>
+          <a:p>
+            <a:pPr algn="ctr"/>
+            <a:r>
+              <a:rPr lang="en-US" dirty="0" smtClean="0"/>
+              <a:t>Developer/verification</a:t>
+            </a:r>
+            <a:br>
+              <a:rPr lang="en-US" dirty="0" smtClean="0"/>
+            </a:br>
+            <a:r>
+              <a:rPr lang="en-US" dirty="0" smtClean="0"/>
+              <a:t>engineer</a:t>
+            </a:r>
+            <a:endParaRPr lang="en-US" dirty="0"/>
+          </a:p>
+        </p:txBody>
+      </p:sp>
+      <p:pic>
+        <p:nvPicPr>
+          <p:cNvPr id="2" name="Picture 1"/>
+          <p:cNvPicPr>
+            <a:picLocks noChangeAspect="1"/>
+          </p:cNvPicPr>
+          <p:nvPr/>
+        </p:nvPicPr>
+        <p:blipFill>
+          <a:blip r:embed="rId2"/>
+          <a:stretch>
+            <a:fillRect/>
+          </a:stretch>
+        </p:blipFill>
+        <p:spPr>
+          <a:xfrm>
+            <a:off x="1066800" y="457200"/>
+            <a:ext cx="1104900" cy="266700"/>
+          </a:xfrm>
+          <a:prstGeom prst="rect">
+            <a:avLst/>
+          </a:prstGeom>
+        </p:spPr>
+      </p:pic>
+      <p:pic>
+        <p:nvPicPr>
+          <p:cNvPr id="3" name="Picture 2"/>
+          <p:cNvPicPr>
+            <a:picLocks noChangeAspect="1"/>
+          </p:cNvPicPr>
+          <p:nvPr/>
+        </p:nvPicPr>
+        <p:blipFill>
+          <a:blip r:embed="rId3"/>
+          <a:stretch>
+            <a:fillRect/>
+          </a:stretch>
+        </p:blipFill>
+        <p:spPr>
+          <a:xfrm>
+            <a:off x="1905000" y="4572000"/>
+            <a:ext cx="838200" cy="916172"/>
+          </a:xfrm>
+          <a:prstGeom prst="rect">
+            <a:avLst/>
+          </a:prstGeom>
+        </p:spPr>
+      </p:pic>
+      <p:sp>
+        <p:nvSpPr>
+          <p:cNvPr id="36" name="Rectangle 35"/>
           <p:cNvSpPr/>
           <p:nvPr/>
         </p:nvSpPr>
         <p:spPr>
           <a:xfrm>
-            <a:off x="4401874" y="3124200"/>
-            <a:ext cx="2209800" cy="1295400"/>
-          </a:xfrm>
-          <a:prstGeom prst="ellipse">
+            <a:off x="2438400" y="1905000"/>
+            <a:ext cx="1676400" cy="762000"/>
+          </a:xfrm>
+          <a:prstGeom prst="rect">
             <a:avLst/>
           </a:prstGeom>
           <a:solidFill>
-            <a:schemeClr val="bg2">
-              <a:lumMod val="50000"/>
-            </a:schemeClr>
+            <a:srgbClr val="92D050"/>
           </a:solidFill>
         </p:spPr>
         <p:style>
@@ -3196,34 +3329,65 @@
             <a:pPr algn="ctr"/>
             <a:r>
               <a:rPr lang="en-US" dirty="0" smtClean="0"/>
-              <a:t>Test (path) storage/query</a:t>
-            </a:r>
-            <a:br>
-              <a:rPr lang="en-US" dirty="0" smtClean="0"/>
-            </a:br>
-            <a:r>
-              <a:rPr lang="en-US" dirty="0" smtClean="0"/>
-              <a:t>engine</a:t>
-            </a:r>
-          </a:p>
-        </p:txBody>
-      </p:sp>
-      <p:sp>
-        <p:nvSpPr>
-          <p:cNvPr id="7" name="Rectangle 6"/>
+              <a:t>SUT</a:t>
+            </a:r>
+            <a:endParaRPr lang="en-US" dirty="0"/>
+          </a:p>
+        </p:txBody>
+      </p:sp>
+      <p:cxnSp>
+        <p:nvCxnSpPr>
+          <p:cNvPr id="38" name="Straight Arrow Connector 37"/>
+          <p:cNvCxnSpPr/>
+          <p:nvPr/>
+        </p:nvCxnSpPr>
+        <p:spPr>
+          <a:xfrm>
+            <a:off x="2514600" y="1676400"/>
+            <a:ext cx="304800" cy="152400"/>
+          </a:xfrm>
+          <a:prstGeom prst="straightConnector1">
+            <a:avLst/>
+          </a:prstGeom>
+          <a:ln>
+            <a:headEnd type="triangle" w="lg" len="lg"/>
+            <a:tailEnd type="none"/>
+          </a:ln>
+        </p:spPr>
+        <p:style>
+          <a:lnRef idx="1">
+            <a:schemeClr val="accent1"/>
+          </a:lnRef>
+          <a:fillRef idx="0">
+            <a:schemeClr val="accent1"/>
+          </a:fillRef>
+          <a:effectRef idx="0">
+            <a:schemeClr val="accent1"/>
+          </a:effectRef>
+          <a:fontRef idx="minor">
+            <a:schemeClr val="tx1"/>
+          </a:fontRef>
+        </p:style>
+      </p:cxnSp>
+      <p:sp>
+        <p:nvSpPr>
+          <p:cNvPr id="48" name="Rectangle 47"/>
           <p:cNvSpPr/>
           <p:nvPr/>
         </p:nvSpPr>
         <p:spPr>
           <a:xfrm>
-            <a:off x="4401874" y="1447800"/>
-            <a:ext cx="2209800" cy="609600"/>
+            <a:off x="4343400" y="1219200"/>
+            <a:ext cx="1066800" cy="762000"/>
           </a:xfrm>
           <a:prstGeom prst="rect">
             <a:avLst/>
           </a:prstGeom>
           <a:solidFill>
-            <a:srgbClr val="92D050"/>
+            <a:schemeClr val="tx2">
+              <a:lumMod val="40000"/>
+              <a:lumOff val="60000"/>
+            </a:schemeClr>
           </a:solidFill>
         </p:spPr>
         <p:style>
@@ -3248,12 +3412,8 @@
           <a:p>
             <a:pPr algn="ctr"/>
             <a:r>
-              <a:rPr lang="en-US" dirty="0" err="1" smtClean="0"/>
-              <a:t>Concolic</a:t>
-            </a:r>
-            <a:r>
               <a:rPr lang="en-US" dirty="0" smtClean="0"/>
-              <a:t> test engine</a:t>
+              <a:t>Mutation tool</a:t>
             </a:r>
             <a:endParaRPr lang="en-US" dirty="0"/>
           </a:p>
@@ -3261,110 +3421,14 @@
       </p:sp>
       <p:sp>
         <p:nvSpPr>
-          <p:cNvPr id="8" name="Right Arrow 7"/>
+          <p:cNvPr id="51" name="Curved Left Arrow 50"/>
           <p:cNvSpPr/>
           <p:nvPr/>
         </p:nvSpPr>
         <p:spPr>
-          <a:xfrm>
-            <a:off x="2877874" y="3505200"/>
-            <a:ext cx="1447800" cy="533400"/>
-          </a:xfrm>
-          <a:prstGeom prst="rightArrow">
-            <a:avLst/>
-          </a:prstGeom>
-          <a:solidFill>
-            <a:schemeClr val="tx1">
-              <a:lumMod val="50000"/>
-              <a:lumOff val="50000"/>
-            </a:schemeClr>
-          </a:solidFill>
-        </p:spPr>
-        <p:style>
-          <a:lnRef idx="2">
-            <a:schemeClr val="accent1">
-              <a:shade val="50000"/>
-            </a:schemeClr>
-          </a:lnRef>
-          <a:fillRef idx="1">
-            <a:schemeClr val="accent1"/>
-          </a:fillRef>
-          <a:effectRef idx="0">
-            <a:schemeClr val="accent1"/>
-          </a:effectRef>
-          <a:fontRef idx="minor">
-            <a:schemeClr val="lt1"/>
-          </a:fontRef>
-        </p:style>
-        <p:txBody>
-          <a:bodyPr rtlCol="0" anchor="ctr"/>
-          <a:lstStyle/>
-          <a:p>
-            <a:pPr algn="ctr"/>
-            <a:r>
-              <a:rPr lang="en-US" dirty="0" smtClean="0"/>
-              <a:t>New paths</a:t>
-            </a:r>
-            <a:endParaRPr lang="en-US" dirty="0"/>
-          </a:p>
-        </p:txBody>
-      </p:sp>
-      <p:sp>
-        <p:nvSpPr>
-          <p:cNvPr id="14" name="Up Arrow 13"/>
-          <p:cNvSpPr/>
-          <p:nvPr/>
-        </p:nvSpPr>
-        <p:spPr>
-          <a:xfrm>
-            <a:off x="5392474" y="2133600"/>
-            <a:ext cx="228600" cy="914400"/>
-          </a:xfrm>
-          <a:prstGeom prst="upArrow">
-            <a:avLst/>
-          </a:prstGeom>
-          <a:solidFill>
-            <a:schemeClr val="tx1">
-              <a:lumMod val="50000"/>
-              <a:lumOff val="50000"/>
-            </a:schemeClr>
-          </a:solidFill>
-        </p:spPr>
-        <p:style>
-          <a:lnRef idx="2">
-            <a:schemeClr val="accent1">
-              <a:shade val="50000"/>
-            </a:schemeClr>
-          </a:lnRef>
-          <a:fillRef idx="1">
-            <a:schemeClr val="accent1"/>
-          </a:fillRef>
-          <a:effectRef idx="0">
-            <a:schemeClr val="accent1"/>
-          </a:effectRef>
-          <a:fontRef idx="minor">
-            <a:schemeClr val="lt1"/>
-          </a:fontRef>
-        </p:style>
-        <p:txBody>
-          <a:bodyPr rtlCol="0" anchor="ctr"/>
-          <a:lstStyle/>
-          <a:p>
-            <a:pPr algn="ctr"/>
-            <a:endParaRPr lang="en-US"/>
-          </a:p>
-        </p:txBody>
-      </p:sp>
-      <p:sp>
-        <p:nvSpPr>
-          <p:cNvPr id="15" name="Curved Left Arrow 14"/>
-          <p:cNvSpPr/>
-          <p:nvPr/>
-        </p:nvSpPr>
-        <p:spPr>
-          <a:xfrm>
-            <a:off x="6687874" y="1600200"/>
-            <a:ext cx="1295400" cy="2514600"/>
+          <a:xfrm flipH="1">
+            <a:off x="228600" y="1066800"/>
+            <a:ext cx="1447800" cy="3886200"/>
           </a:xfrm>
           <a:prstGeom prst="curvedLeftArrow">
             <a:avLst/>
@@ -3405,147 +3469,23 @@
           </a:p>
         </p:txBody>
       </p:sp>
-      <p:sp>
-        <p:nvSpPr>
-          <p:cNvPr id="16" name="TextBox 15"/>
-          <p:cNvSpPr txBox="1"/>
-          <p:nvPr/>
-        </p:nvSpPr>
-        <p:spPr>
-          <a:xfrm>
-            <a:off x="5544874" y="2362200"/>
-            <a:ext cx="1660647" cy="523220"/>
-          </a:xfrm>
-          <a:prstGeom prst="rect">
-            <a:avLst/>
-          </a:prstGeom>
-          <a:noFill/>
-        </p:spPr>
-        <p:txBody>
-          <a:bodyPr wrap="none" rtlCol="0">
-            <a:spAutoFit/>
-          </a:bodyPr>
-          <a:lstStyle/>
-          <a:p>
-            <a:r>
-              <a:rPr lang="en-US" sz="1400" dirty="0" smtClean="0"/>
-              <a:t>Paths closest to</a:t>
-            </a:r>
-            <a:br>
-              <a:rPr lang="en-US" sz="1400" dirty="0" smtClean="0"/>
-            </a:br>
-            <a:r>
-              <a:rPr lang="en-US" sz="1400" dirty="0" smtClean="0"/>
-              <a:t>uncovered branches</a:t>
-            </a:r>
-            <a:endParaRPr lang="en-US" sz="1400" dirty="0"/>
-          </a:p>
-        </p:txBody>
-      </p:sp>
-      <p:sp>
-        <p:nvSpPr>
-          <p:cNvPr id="17" name="TextBox 16"/>
-          <p:cNvSpPr txBox="1"/>
-          <p:nvPr/>
-        </p:nvSpPr>
-        <p:spPr>
-          <a:xfrm>
-            <a:off x="7983274" y="2438400"/>
-            <a:ext cx="703526" cy="646331"/>
-          </a:xfrm>
-          <a:prstGeom prst="rect">
-            <a:avLst/>
-          </a:prstGeom>
-          <a:noFill/>
-        </p:spPr>
-        <p:txBody>
-          <a:bodyPr wrap="none" rtlCol="0">
-            <a:spAutoFit/>
-          </a:bodyPr>
-          <a:lstStyle/>
-          <a:p>
-            <a:r>
-              <a:rPr lang="en-US" dirty="0" smtClean="0"/>
-              <a:t>New</a:t>
-            </a:r>
-            <a:br>
-              <a:rPr lang="en-US" dirty="0" smtClean="0"/>
-            </a:br>
-            <a:r>
-              <a:rPr lang="en-US" dirty="0" smtClean="0"/>
-              <a:t>paths</a:t>
-            </a:r>
-            <a:endParaRPr lang="en-US" dirty="0"/>
-          </a:p>
-        </p:txBody>
-      </p:sp>
-      <p:sp>
-        <p:nvSpPr>
-          <p:cNvPr id="18" name="Rectangle 17"/>
-          <p:cNvSpPr/>
-          <p:nvPr/>
-        </p:nvSpPr>
-        <p:spPr>
-          <a:xfrm>
-            <a:off x="4630474" y="457200"/>
-            <a:ext cx="1752600" cy="457200"/>
-          </a:xfrm>
-          <a:prstGeom prst="rect">
-            <a:avLst/>
-          </a:prstGeom>
-          <a:solidFill>
-            <a:srgbClr val="92D050"/>
-          </a:solidFill>
-        </p:spPr>
-        <p:style>
-          <a:lnRef idx="2">
-            <a:schemeClr val="accent1">
-              <a:shade val="50000"/>
-            </a:schemeClr>
-          </a:lnRef>
-          <a:fillRef idx="1">
-            <a:schemeClr val="accent1"/>
-          </a:fillRef>
-          <a:effectRef idx="0">
-            <a:schemeClr val="accent1"/>
-          </a:effectRef>
-          <a:fontRef idx="minor">
-            <a:schemeClr val="lt1"/>
-          </a:fontRef>
-        </p:style>
-        <p:txBody>
-          <a:bodyPr rtlCol="0" anchor="ctr"/>
-          <a:lstStyle/>
-          <a:p>
-            <a:pPr algn="ctr"/>
-            <a:r>
-              <a:rPr lang="en-US" dirty="0" smtClean="0"/>
-              <a:t>Constraint solver</a:t>
-            </a:r>
-            <a:endParaRPr lang="en-US" dirty="0"/>
-          </a:p>
-        </p:txBody>
-      </p:sp>
       <p:cxnSp>
         <p:nvCxnSpPr>
-          <p:cNvPr id="22" name="Straight Arrow Connector 21"/>
-          <p:cNvCxnSpPr>
-            <a:stCxn id="18" idx="2"/>
-            <a:endCxn id="7" idx="0"/>
-          </p:cNvCxnSpPr>
+          <p:cNvPr id="52" name="Straight Arrow Connector 51"/>
+          <p:cNvCxnSpPr/>
           <p:nvPr/>
         </p:nvCxnSpPr>
         <p:spPr>
-          <a:xfrm rot="5400000">
-            <a:off x="5240074" y="1181100"/>
-            <a:ext cx="533400" cy="1588"/>
+          <a:xfrm flipH="1">
+            <a:off x="1828800" y="2514600"/>
+            <a:ext cx="533400" cy="1828800"/>
           </a:xfrm>
           <a:prstGeom prst="straightConnector1">
             <a:avLst/>
           </a:prstGeom>
           <a:ln>
-            <a:headEnd type="arrow"/>
-            <a:tailEnd type="arrow"/>
+            <a:headEnd type="triangle" w="lg" len="lg"/>
+            <a:tailEnd type="none"/>
           </a:ln>
         </p:spPr>
         <p:style>
@@ -3565,24 +3505,93 @@
       </p:cxnSp>
       <p:cxnSp>
         <p:nvCxnSpPr>
-          <p:cNvPr id="24" name="Straight Arrow Connector 23"/>
-          <p:cNvCxnSpPr>
-            <a:stCxn id="7" idx="1"/>
-            <a:endCxn id="4" idx="3"/>
-          </p:cNvCxnSpPr>
+          <p:cNvPr id="55" name="Straight Arrow Connector 54"/>
+          <p:cNvCxnSpPr/>
           <p:nvPr/>
         </p:nvCxnSpPr>
         <p:spPr>
-          <a:xfrm rot="10800000">
-            <a:off x="2801674" y="1752600"/>
-            <a:ext cx="1600200" cy="1588"/>
+          <a:xfrm flipH="1">
+            <a:off x="1981200" y="3581400"/>
+            <a:ext cx="381000" cy="762000"/>
           </a:xfrm>
           <a:prstGeom prst="straightConnector1">
             <a:avLst/>
           </a:prstGeom>
           <a:ln>
-            <a:headEnd type="arrow"/>
-            <a:tailEnd type="arrow"/>
+            <a:headEnd type="triangle" w="lg" len="lg"/>
+            <a:tailEnd type="none"/>
+          </a:ln>
+        </p:spPr>
+        <p:style>
+          <a:lnRef idx="1">
+            <a:schemeClr val="accent1"/>
+          </a:lnRef>
+          <a:fillRef idx="0">
+            <a:schemeClr val="accent1"/>
+          </a:fillRef>
+          <a:effectRef idx="0">
+            <a:schemeClr val="accent1"/>
+          </a:effectRef>
+          <a:fontRef idx="minor">
+            <a:schemeClr val="tx1"/>
+          </a:fontRef>
+        </p:style>
+      </p:cxnSp>
+      <p:sp>
+        <p:nvSpPr>
+          <p:cNvPr id="58" name="TextBox 57"/>
+          <p:cNvSpPr txBox="1"/>
+          <p:nvPr/>
+        </p:nvSpPr>
+        <p:spPr>
+          <a:xfrm>
+            <a:off x="228600" y="2590800"/>
+            <a:ext cx="1838965" cy="646331"/>
+          </a:xfrm>
+          <a:prstGeom prst="rect">
+            <a:avLst/>
+          </a:prstGeom>
+          <a:noFill/>
+        </p:spPr>
+        <p:txBody>
+          <a:bodyPr wrap="none" rtlCol="0">
+            <a:spAutoFit/>
+          </a:bodyPr>
+          <a:lstStyle/>
+          <a:p>
+            <a:pPr algn="ctr"/>
+            <a:r>
+              <a:rPr lang="en-US" dirty="0" smtClean="0"/>
+              <a:t>Counterexamples</a:t>
+            </a:r>
+            <a:br>
+              <a:rPr lang="en-US" dirty="0" smtClean="0"/>
+            </a:br>
+            <a:r>
+              <a:rPr lang="en-US" dirty="0" smtClean="0"/>
+              <a:t>and verifications</a:t>
+            </a:r>
+            <a:endParaRPr lang="en-US" dirty="0"/>
+          </a:p>
+        </p:txBody>
+      </p:sp>
+      <p:cxnSp>
+        <p:nvCxnSpPr>
+          <p:cNvPr id="80" name="Straight Arrow Connector 79"/>
+          <p:cNvCxnSpPr/>
+          <p:nvPr/>
+        </p:nvCxnSpPr>
+        <p:spPr>
+          <a:xfrm flipH="1">
+            <a:off x="3581400" y="1600200"/>
+            <a:ext cx="609600" cy="228600"/>
+          </a:xfrm>
+          <a:prstGeom prst="straightConnector1">
+            <a:avLst/>
+          </a:prstGeom>
+          <a:ln>
+            <a:headEnd type="triangle" w="lg" len="lg"/>
+            <a:tailEnd type="none"/>
           </a:ln>
         </p:spPr>
         <p:style>
@@ -3602,24 +3611,21 @@
       </p:cxnSp>
       <p:cxnSp>
         <p:nvCxnSpPr>
-          <p:cNvPr id="26" name="Straight Arrow Connector 25"/>
-          <p:cNvCxnSpPr>
-            <a:stCxn id="4" idx="2"/>
-            <a:endCxn id="5" idx="0"/>
-          </p:cNvCxnSpPr>
+          <p:cNvPr id="83" name="Straight Arrow Connector 82"/>
+          <p:cNvCxnSpPr/>
           <p:nvPr/>
         </p:nvCxnSpPr>
         <p:spPr>
-          <a:xfrm rot="5400000">
-            <a:off x="1329771" y="2767303"/>
-            <a:ext cx="1267407" cy="1588"/>
+          <a:xfrm flipH="1">
+            <a:off x="4191000" y="2133600"/>
+            <a:ext cx="304800" cy="914400"/>
           </a:xfrm>
           <a:prstGeom prst="straightConnector1">
             <a:avLst/>
           </a:prstGeom>
           <a:ln>
-            <a:headEnd type="arrow"/>
-            <a:tailEnd type="arrow"/>
+            <a:headEnd type="triangle" w="lg" len="lg"/>
+            <a:tailEnd type="none"/>
           </a:ln>
         </p:spPr>
         <p:style>
@@ -3639,245 +3645,25 @@
       </p:cxnSp>
       <p:sp>
         <p:nvSpPr>
-          <p:cNvPr id="27" name="TextBox 26"/>
-          <p:cNvSpPr txBox="1"/>
+          <p:cNvPr id="104" name="Rectangle 103"/>
+          <p:cNvSpPr/>
           <p:nvPr/>
         </p:nvSpPr>
         <p:spPr>
           <a:xfrm>
-            <a:off x="5468674" y="1066800"/>
-            <a:ext cx="1358192" cy="307777"/>
+            <a:off x="6629400" y="3581400"/>
+            <a:ext cx="1676400" cy="1066800"/>
           </a:xfrm>
           <a:prstGeom prst="rect">
             <a:avLst/>
           </a:prstGeom>
-          <a:noFill/>
-        </p:spPr>
-        <p:txBody>
-          <a:bodyPr wrap="none" rtlCol="0">
-            <a:spAutoFit/>
-          </a:bodyPr>
-          <a:lstStyle/>
-          <a:p>
-            <a:r>
-              <a:rPr lang="en-US" sz="1400" dirty="0" smtClean="0"/>
-              <a:t>Path constraints</a:t>
-            </a:r>
-            <a:endParaRPr lang="en-US" sz="1400" dirty="0"/>
-          </a:p>
-        </p:txBody>
-      </p:sp>
-      <p:sp>
-        <p:nvSpPr>
-          <p:cNvPr id="28" name="TextBox 27"/>
-          <p:cNvSpPr txBox="1"/>
-          <p:nvPr/>
-        </p:nvSpPr>
-        <p:spPr>
-          <a:xfrm>
-            <a:off x="2782061" y="1219200"/>
-            <a:ext cx="1713739" cy="523220"/>
-          </a:xfrm>
-          <a:prstGeom prst="rect">
-            <a:avLst/>
-          </a:prstGeom>
-          <a:noFill/>
-        </p:spPr>
-        <p:txBody>
-          <a:bodyPr wrap="none" rtlCol="0">
-            <a:spAutoFit/>
-          </a:bodyPr>
-          <a:lstStyle/>
-          <a:p>
-            <a:r>
-              <a:rPr lang="en-US" sz="1400" dirty="0" smtClean="0"/>
-              <a:t>Testing via API calls +</a:t>
-            </a:r>
-            <a:br>
-              <a:rPr lang="en-US" sz="1400" dirty="0" smtClean="0"/>
-            </a:br>
-            <a:r>
-              <a:rPr lang="en-US" sz="1400" dirty="0" smtClean="0"/>
-              <a:t>symbolic execution</a:t>
-            </a:r>
-          </a:p>
-        </p:txBody>
-      </p:sp>
-      <p:sp>
-        <p:nvSpPr>
-          <p:cNvPr id="29" name="TextBox 28"/>
-          <p:cNvSpPr txBox="1"/>
-          <p:nvPr/>
-        </p:nvSpPr>
-        <p:spPr>
-          <a:xfrm>
-            <a:off x="838200" y="2401669"/>
-            <a:ext cx="1106650" cy="738664"/>
-          </a:xfrm>
-          <a:prstGeom prst="rect">
-            <a:avLst/>
-          </a:prstGeom>
-          <a:noFill/>
-        </p:spPr>
-        <p:txBody>
-          <a:bodyPr wrap="none" rtlCol="0">
-            <a:spAutoFit/>
-          </a:bodyPr>
-          <a:lstStyle/>
-          <a:p>
-            <a:r>
-              <a:rPr lang="en-US" sz="1400" dirty="0" smtClean="0"/>
-              <a:t>Testing via</a:t>
-            </a:r>
-            <a:br>
-              <a:rPr lang="en-US" sz="1400" dirty="0" smtClean="0"/>
-            </a:br>
-            <a:r>
-              <a:rPr lang="en-US" sz="1400" dirty="0" smtClean="0"/>
-              <a:t>API calls</a:t>
-            </a:r>
-            <a:r>
-              <a:rPr lang="en-US" sz="1400" dirty="0"/>
-              <a:t> </a:t>
-            </a:r>
-            <a:r>
-              <a:rPr lang="en-US" sz="1400" dirty="0" smtClean="0"/>
-              <a:t>+</a:t>
-            </a:r>
-            <a:br>
-              <a:rPr lang="en-US" sz="1400" dirty="0" smtClean="0"/>
-            </a:br>
-            <a:r>
-              <a:rPr lang="en-US" sz="1400" dirty="0" smtClean="0"/>
-              <a:t>backtracking</a:t>
-            </a:r>
-          </a:p>
-        </p:txBody>
-      </p:sp>
-      <p:sp>
-        <p:nvSpPr>
-          <p:cNvPr id="30" name="TextBox 29"/>
-          <p:cNvSpPr txBox="1"/>
-          <p:nvPr/>
-        </p:nvSpPr>
-        <p:spPr>
-          <a:xfrm>
-            <a:off x="914400" y="4153676"/>
-            <a:ext cx="2113527" cy="307777"/>
-          </a:xfrm>
-          <a:prstGeom prst="rect">
-            <a:avLst/>
-          </a:prstGeom>
-          <a:noFill/>
-        </p:spPr>
-        <p:txBody>
-          <a:bodyPr wrap="none" rtlCol="0">
-            <a:spAutoFit/>
-          </a:bodyPr>
-          <a:lstStyle/>
-          <a:p>
-            <a:r>
-              <a:rPr lang="en-US" sz="1400" dirty="0" smtClean="0"/>
-              <a:t>(or random testing or BET)</a:t>
-            </a:r>
-            <a:endParaRPr lang="en-US" sz="1400" dirty="0"/>
-          </a:p>
-        </p:txBody>
-      </p:sp>
-      <p:pic>
-        <p:nvPicPr>
-          <p:cNvPr id="1026" name="Picture 2" descr="C:\Users\alex\AppData\Local\Microsoft\Windows\Temporary Internet Files\Content.IE5\79OXJ0YU\MCBD08154_0000[1].wmf"/>
-          <p:cNvPicPr>
-            <a:picLocks noChangeAspect="1" noChangeArrowheads="1"/>
-          </p:cNvPicPr>
-          <p:nvPr/>
-        </p:nvPicPr>
-        <p:blipFill>
-          <a:blip r:embed="rId2" cstate="print"/>
-          <a:srcRect/>
-          <a:stretch>
-            <a:fillRect/>
-          </a:stretch>
-        </p:blipFill>
-        <p:spPr bwMode="auto">
-          <a:xfrm>
-            <a:off x="3018194" y="5181600"/>
-            <a:ext cx="1231280" cy="841374"/>
-          </a:xfrm>
-          <a:prstGeom prst="rect">
-            <a:avLst/>
-          </a:prstGeom>
-          <a:noFill/>
-        </p:spPr>
-      </p:pic>
-      <p:sp>
-        <p:nvSpPr>
-          <p:cNvPr id="32" name="TextBox 31"/>
-          <p:cNvSpPr txBox="1"/>
-          <p:nvPr/>
-        </p:nvSpPr>
-        <p:spPr>
-          <a:xfrm>
-            <a:off x="2344474" y="6019800"/>
-            <a:ext cx="2476127" cy="369332"/>
-          </a:xfrm>
-          <a:prstGeom prst="rect">
-            <a:avLst/>
-          </a:prstGeom>
-          <a:noFill/>
-        </p:spPr>
-        <p:txBody>
-          <a:bodyPr wrap="none" rtlCol="0">
-            <a:spAutoFit/>
-          </a:bodyPr>
-          <a:lstStyle/>
-          <a:p>
-            <a:r>
-              <a:rPr lang="en-US" dirty="0" smtClean="0"/>
-              <a:t>Test engineer/developer</a:t>
-            </a:r>
-            <a:endParaRPr lang="en-US" dirty="0"/>
-          </a:p>
-        </p:txBody>
-      </p:sp>
-      <p:pic>
-        <p:nvPicPr>
-          <p:cNvPr id="33" name="Picture 32" descr="spinlogo2_small.gif"/>
-          <p:cNvPicPr>
-            <a:picLocks noChangeAspect="1"/>
-          </p:cNvPicPr>
-          <p:nvPr/>
-        </p:nvPicPr>
-        <p:blipFill>
-          <a:blip r:embed="rId3" cstate="print"/>
-          <a:stretch>
-            <a:fillRect/>
-          </a:stretch>
-        </p:blipFill>
-        <p:spPr>
-          <a:xfrm>
-            <a:off x="439474" y="3505200"/>
-            <a:ext cx="609600" cy="609600"/>
-          </a:xfrm>
-          <a:prstGeom prst="rect">
-            <a:avLst/>
-          </a:prstGeom>
-        </p:spPr>
-      </p:pic>
-      <p:sp>
-        <p:nvSpPr>
-          <p:cNvPr id="34" name="Oval 33"/>
-          <p:cNvSpPr/>
-          <p:nvPr/>
-        </p:nvSpPr>
-        <p:spPr>
-          <a:xfrm>
-            <a:off x="4953000" y="5715000"/>
-            <a:ext cx="2133600" cy="838200"/>
-          </a:xfrm>
-          <a:prstGeom prst="ellipse">
-            <a:avLst/>
-          </a:prstGeom>
+          <a:solidFill>
+            <a:schemeClr val="tx2">
+              <a:lumMod val="60000"/>
+              <a:lumOff val="40000"/>
+            </a:schemeClr>
+          </a:solidFill>
+          <a:ln w="76200"/>
         </p:spPr>
         <p:style>
           <a:lnRef idx="2">
@@ -3901,41 +3687,46 @@
           <a:p>
             <a:pPr algn="ctr"/>
             <a:r>
-              <a:rPr lang="en-US" sz="1400" dirty="0" smtClean="0"/>
-              <a:t>Test </a:t>
-            </a:r>
-            <a:r>
-              <a:rPr lang="en-US" sz="1400" dirty="0" smtClean="0"/>
-              <a:t>suite</a:t>
-            </a:r>
-            <a:br>
-              <a:rPr lang="en-US" sz="1400" dirty="0" smtClean="0"/>
-            </a:br>
-            <a:r>
-              <a:rPr lang="en-US" sz="1400" dirty="0" smtClean="0"/>
-              <a:t>(branch </a:t>
-            </a:r>
-            <a:r>
-              <a:rPr lang="en-US" sz="1400" dirty="0" smtClean="0"/>
-              <a:t>coverage)</a:t>
-            </a:r>
-          </a:p>
-        </p:txBody>
-      </p:sp>
-      <p:sp>
-        <p:nvSpPr>
-          <p:cNvPr id="35" name="Oval 34"/>
+              <a:rPr lang="en-US" dirty="0" smtClean="0"/>
+              <a:t>Problem </a:t>
+            </a:r>
+            <a:r>
+              <a:rPr lang="en-US" dirty="0" err="1" smtClean="0"/>
+              <a:t>sizer</a:t>
+            </a:r>
+            <a:endParaRPr lang="en-US" dirty="0" smtClean="0"/>
+          </a:p>
+          <a:p>
+            <a:pPr algn="ctr"/>
+            <a:r>
+              <a:rPr lang="en-US" dirty="0" smtClean="0"/>
+              <a:t>(find-size)</a:t>
+            </a:r>
+            <a:endParaRPr lang="en-US" dirty="0" smtClean="0"/>
+          </a:p>
+        </p:txBody>
+      </p:sp>
+      <p:sp>
+        <p:nvSpPr>
+          <p:cNvPr id="121" name="Rectangle 120"/>
           <p:cNvSpPr/>
           <p:nvPr/>
         </p:nvSpPr>
         <p:spPr>
           <a:xfrm>
-            <a:off x="5943600" y="5181600"/>
-            <a:ext cx="1676400" cy="762000"/>
-          </a:xfrm>
-          <a:prstGeom prst="ellipse">
+            <a:off x="6629400" y="762000"/>
+            <a:ext cx="1676400" cy="1066800"/>
+          </a:xfrm>
+          <a:prstGeom prst="rect">
             <a:avLst/>
           </a:prstGeom>
+          <a:solidFill>
+            <a:schemeClr val="tx2">
+              <a:lumMod val="60000"/>
+              <a:lumOff val="40000"/>
+            </a:schemeClr>
+          </a:solidFill>
+          <a:ln w="76200"/>
         </p:spPr>
         <p:style>
           <a:lnRef idx="2">
@@ -3959,49 +3750,166 @@
           <a:p>
             <a:pPr algn="ctr"/>
             <a:r>
-              <a:rPr lang="en-US" sz="1400" dirty="0" smtClean="0"/>
-              <a:t>Test suite</a:t>
-            </a:r>
-            <a:r>
-              <a:rPr lang="en-US" sz="1400" dirty="0"/>
-              <a:t/>
+              <a:rPr lang="en-US" dirty="0" smtClean="0"/>
+              <a:t>Harness analysis</a:t>
+            </a:r>
+          </a:p>
+          <a:p>
+            <a:pPr algn="ctr"/>
+            <a:r>
+              <a:rPr lang="en-US" dirty="0" smtClean="0"/>
+              <a:t>(check-harness)</a:t>
+            </a:r>
+          </a:p>
+        </p:txBody>
+      </p:sp>
+      <p:sp>
+        <p:nvSpPr>
+          <p:cNvPr id="124" name="Rectangle 123"/>
+          <p:cNvSpPr/>
+          <p:nvPr/>
+        </p:nvSpPr>
+        <p:spPr>
+          <a:xfrm>
+            <a:off x="6629400" y="2133600"/>
+            <a:ext cx="1676400" cy="1066800"/>
+          </a:xfrm>
+          <a:prstGeom prst="rect">
+            <a:avLst/>
+          </a:prstGeom>
+          <a:solidFill>
+            <a:schemeClr val="tx2">
+              <a:lumMod val="60000"/>
+              <a:lumOff val="40000"/>
+            </a:schemeClr>
+          </a:solidFill>
+          <a:ln w="76200"/>
+        </p:spPr>
+        <p:style>
+          <a:lnRef idx="2">
+            <a:schemeClr val="accent1">
+              <a:shade val="50000"/>
+            </a:schemeClr>
+          </a:lnRef>
+          <a:fillRef idx="1">
+            <a:schemeClr val="accent1"/>
+          </a:fillRef>
+          <a:effectRef idx="0">
+            <a:schemeClr val="accent1"/>
+          </a:effectRef>
+          <a:fontRef idx="minor">
+            <a:schemeClr val="lt1"/>
+          </a:fontRef>
+        </p:style>
+        <p:txBody>
+          <a:bodyPr rtlCol="0" anchor="ctr"/>
+          <a:lstStyle/>
+          <a:p>
+            <a:pPr algn="ctr"/>
+            <a:r>
+              <a:rPr lang="en-US" dirty="0" smtClean="0"/>
+              <a:t>Mutant explanation</a:t>
+            </a:r>
+          </a:p>
+          <a:p>
+            <a:pPr algn="ctr"/>
+            <a:r>
+              <a:rPr lang="en-US" dirty="0" smtClean="0"/>
+              <a:t>(</a:t>
+            </a:r>
+            <a:r>
+              <a:rPr lang="en-US" dirty="0" err="1" smtClean="0"/>
+              <a:t>maxcover</a:t>
+            </a:r>
+            <a:r>
+              <a:rPr lang="en-US" dirty="0" smtClean="0"/>
+              <a:t>)</a:t>
+            </a:r>
+            <a:endParaRPr lang="en-US" dirty="0" smtClean="0"/>
+          </a:p>
+        </p:txBody>
+      </p:sp>
+      <p:sp>
+        <p:nvSpPr>
+          <p:cNvPr id="129" name="Rectangle 128"/>
+          <p:cNvSpPr/>
+          <p:nvPr/>
+        </p:nvSpPr>
+        <p:spPr>
+          <a:xfrm>
+            <a:off x="6629400" y="5029200"/>
+            <a:ext cx="1676400" cy="1066800"/>
+          </a:xfrm>
+          <a:prstGeom prst="rect">
+            <a:avLst/>
+          </a:prstGeom>
+          <a:solidFill>
+            <a:schemeClr val="tx2">
+              <a:lumMod val="60000"/>
+              <a:lumOff val="40000"/>
+            </a:schemeClr>
+          </a:solidFill>
+          <a:ln w="76200"/>
+        </p:spPr>
+        <p:style>
+          <a:lnRef idx="2">
+            <a:schemeClr val="accent1">
+              <a:shade val="50000"/>
+            </a:schemeClr>
+          </a:lnRef>
+          <a:fillRef idx="1">
+            <a:schemeClr val="accent1"/>
+          </a:fillRef>
+          <a:effectRef idx="0">
+            <a:schemeClr val="accent1"/>
+          </a:effectRef>
+          <a:fontRef idx="minor">
+            <a:schemeClr val="lt1"/>
+          </a:fontRef>
+        </p:style>
+        <p:txBody>
+          <a:bodyPr rtlCol="0" anchor="ctr"/>
+          <a:lstStyle/>
+          <a:p>
+            <a:pPr algn="ctr"/>
+            <a:r>
+              <a:rPr lang="en-US" dirty="0" smtClean="0"/>
+              <a:t>Basic mutation</a:t>
             </a:r>
             <a:br>
-              <a:rPr lang="en-US" sz="1400" dirty="0"/>
+              <a:rPr lang="en-US" dirty="0" smtClean="0"/>
             </a:br>
             <a:r>
-              <a:rPr lang="en-US" sz="1400" dirty="0" smtClean="0"/>
-              <a:t>(regression)</a:t>
-            </a:r>
+              <a:rPr lang="en-US" dirty="0" smtClean="0"/>
+              <a:t>analysis</a:t>
+            </a:r>
+            <a:endParaRPr lang="en-US" dirty="0" smtClean="0"/>
           </a:p>
         </p:txBody>
       </p:sp>
       <p:cxnSp>
         <p:nvCxnSpPr>
-          <p:cNvPr id="37" name="Straight Arrow Connector 36"/>
+          <p:cNvPr id="1051" name="Straight Connector 1050"/>
           <p:cNvCxnSpPr/>
           <p:nvPr/>
         </p:nvCxnSpPr>
         <p:spPr>
-          <a:xfrm rot="5400000" flipH="1" flipV="1">
-            <a:off x="4191000" y="4419600"/>
-            <a:ext cx="838200" cy="838200"/>
-          </a:xfrm>
-          <a:prstGeom prst="straightConnector1">
+          <a:xfrm>
+            <a:off x="8534400" y="990600"/>
+            <a:ext cx="0" cy="4876800"/>
+          </a:xfrm>
+          <a:prstGeom prst="line">
             <a:avLst/>
           </a:prstGeom>
-          <a:ln>
-            <a:tailEnd type="arrow"/>
-          </a:ln>
         </p:spPr>
         <p:style>
-          <a:lnRef idx="1">
+          <a:lnRef idx="2">
             <a:schemeClr val="accent1"/>
           </a:lnRef>
           <a:fillRef idx="0">
             <a:schemeClr val="accent1"/>
           </a:fillRef>
-          <a:effectRef idx="0">
+          <a:effectRef idx="1">
             <a:schemeClr val="accent1"/>
           </a:effectRef>
           <a:fontRef idx="minor">
@@ -4011,32 +3919,27 @@
       </p:cxnSp>
       <p:cxnSp>
         <p:nvCxnSpPr>
-          <p:cNvPr id="39" name="Straight Arrow Connector 38"/>
-          <p:cNvCxnSpPr>
-            <a:stCxn id="6" idx="4"/>
-          </p:cNvCxnSpPr>
+          <p:cNvPr id="1053" name="Straight Connector 1052"/>
+          <p:cNvCxnSpPr/>
           <p:nvPr/>
         </p:nvCxnSpPr>
         <p:spPr>
-          <a:xfrm rot="16200000" flipH="1">
-            <a:off x="4963187" y="4963187"/>
-            <a:ext cx="1295400" cy="208226"/>
-          </a:xfrm>
-          <a:prstGeom prst="straightConnector1">
+          <a:xfrm flipH="1">
+            <a:off x="8458200" y="990600"/>
+            <a:ext cx="76200" cy="0"/>
+          </a:xfrm>
+          <a:prstGeom prst="line">
             <a:avLst/>
           </a:prstGeom>
-          <a:ln>
-            <a:tailEnd type="arrow"/>
-          </a:ln>
         </p:spPr>
         <p:style>
-          <a:lnRef idx="1">
+          <a:lnRef idx="2">
             <a:schemeClr val="accent1"/>
           </a:lnRef>
           <a:fillRef idx="0">
             <a:schemeClr val="accent1"/>
           </a:fillRef>
-          <a:effectRef idx="0">
+          <a:effectRef idx="1">
             <a:schemeClr val="accent1"/>
           </a:effectRef>
           <a:fontRef idx="minor">
@@ -4046,17 +3949,125 @@
       </p:cxnSp>
       <p:cxnSp>
         <p:nvCxnSpPr>
-          <p:cNvPr id="41" name="Straight Arrow Connector 40"/>
+          <p:cNvPr id="134" name="Straight Connector 133"/>
+          <p:cNvCxnSpPr/>
+          <p:nvPr/>
+        </p:nvCxnSpPr>
+        <p:spPr>
+          <a:xfrm flipH="1">
+            <a:off x="8458200" y="5867400"/>
+            <a:ext cx="76200" cy="0"/>
+          </a:xfrm>
+          <a:prstGeom prst="line">
+            <a:avLst/>
+          </a:prstGeom>
+        </p:spPr>
+        <p:style>
+          <a:lnRef idx="2">
+            <a:schemeClr val="accent1"/>
+          </a:lnRef>
+          <a:fillRef idx="0">
+            <a:schemeClr val="accent1"/>
+          </a:fillRef>
+          <a:effectRef idx="1">
+            <a:schemeClr val="accent1"/>
+          </a:effectRef>
+          <a:fontRef idx="minor">
+            <a:schemeClr val="tx1"/>
+          </a:fontRef>
+        </p:style>
+      </p:cxnSp>
+      <p:sp>
+        <p:nvSpPr>
+          <p:cNvPr id="127" name="Freeform 126"/>
+          <p:cNvSpPr/>
+          <p:nvPr/>
+        </p:nvSpPr>
+        <p:spPr>
+          <a:xfrm>
+            <a:off x="5508625" y="281359"/>
+            <a:ext cx="3554614" cy="2687266"/>
+          </a:xfrm>
+          <a:custGeom>
+            <a:avLst/>
+            <a:gdLst>
+              <a:gd name="connsiteX0" fmla="*/ 3127375 w 3554614"/>
+              <a:gd name="connsiteY0" fmla="*/ 2687266 h 2687266"/>
+              <a:gd name="connsiteX1" fmla="*/ 3286125 w 3554614"/>
+              <a:gd name="connsiteY1" fmla="*/ 226641 h 2687266"/>
+              <a:gd name="connsiteX2" fmla="*/ 0 w 3554614"/>
+              <a:gd name="connsiteY2" fmla="*/ 258391 h 2687266"/>
+            </a:gdLst>
+            <a:ahLst/>
+            <a:cxnLst>
+              <a:cxn ang="0">
+                <a:pos x="connsiteX0" y="connsiteY0"/>
+              </a:cxn>
+              <a:cxn ang="0">
+                <a:pos x="connsiteX1" y="connsiteY1"/>
+              </a:cxn>
+              <a:cxn ang="0">
+                <a:pos x="connsiteX2" y="connsiteY2"/>
+              </a:cxn>
+            </a:cxnLst>
+            <a:rect l="l" t="t" r="r" b="b"/>
+            <a:pathLst>
+              <a:path w="3554614" h="2687266">
+                <a:moveTo>
+                  <a:pt x="3127375" y="2687266"/>
+                </a:moveTo>
+                <a:cubicBezTo>
+                  <a:pt x="3467364" y="1659359"/>
+                  <a:pt x="3807354" y="631453"/>
+                  <a:pt x="3286125" y="226641"/>
+                </a:cubicBezTo>
+                <a:cubicBezTo>
+                  <a:pt x="2764896" y="-178171"/>
+                  <a:pt x="1382448" y="40110"/>
+                  <a:pt x="0" y="258391"/>
+                </a:cubicBezTo>
+              </a:path>
+            </a:pathLst>
+          </a:custGeom>
+          <a:ln>
+            <a:headEnd type="triangle" w="lg" len="lg"/>
+          </a:ln>
+        </p:spPr>
+        <p:style>
+          <a:lnRef idx="2">
+            <a:schemeClr val="accent1"/>
+          </a:lnRef>
+          <a:fillRef idx="0">
+            <a:schemeClr val="accent1"/>
+          </a:fillRef>
+          <a:effectRef idx="1">
+            <a:schemeClr val="accent1"/>
+          </a:effectRef>
+          <a:fontRef idx="minor">
+            <a:schemeClr val="tx1"/>
+          </a:fontRef>
+        </p:style>
+        <p:txBody>
+          <a:bodyPr rtlCol="0" anchor="ctr"/>
+          <a:lstStyle/>
+          <a:p>
+            <a:pPr algn="ctr"/>
+            <a:endParaRPr lang="en-US"/>
+          </a:p>
+        </p:txBody>
+      </p:sp>
+      <p:cxnSp>
+        <p:nvCxnSpPr>
+          <p:cNvPr id="133" name="Straight Arrow Connector 132"/>
           <p:cNvCxnSpPr>
-            <a:stCxn id="6" idx="4"/>
-            <a:endCxn id="35" idx="0"/>
+            <a:stCxn id="127" idx="2"/>
           </p:cNvCxnSpPr>
           <p:nvPr/>
         </p:nvCxnSpPr>
         <p:spPr>
-          <a:xfrm rot="16200000" flipH="1">
-            <a:off x="5763287" y="4163087"/>
-            <a:ext cx="762000" cy="1275026"/>
+          <a:xfrm flipH="1">
+            <a:off x="3657600" y="539750"/>
+            <a:ext cx="1851025" cy="527050"/>
           </a:xfrm>
           <a:prstGeom prst="straightConnector1">
             <a:avLst/>
@@ -4066,13 +4077,13 @@
           </a:ln>
         </p:spPr>
         <p:style>
-          <a:lnRef idx="1">
+          <a:lnRef idx="2">
             <a:schemeClr val="accent1"/>
           </a:lnRef>
           <a:fillRef idx="0">
             <a:schemeClr val="accent1"/>
           </a:fillRef>
-          <a:effectRef idx="0">
+          <a:effectRef idx="1">
             <a:schemeClr val="accent1"/>
           </a:effectRef>
           <a:fontRef idx="minor">
@@ -4080,67 +4091,18 @@
           </a:fontRef>
         </p:style>
       </p:cxnSp>
-      <p:sp>
-        <p:nvSpPr>
-          <p:cNvPr id="42" name="TextBox 41"/>
-          <p:cNvSpPr txBox="1"/>
-          <p:nvPr/>
-        </p:nvSpPr>
-        <p:spPr>
-          <a:xfrm>
-            <a:off x="4351668" y="4950023"/>
-            <a:ext cx="1372363" cy="769441"/>
-          </a:xfrm>
-          <a:prstGeom prst="rect">
-            <a:avLst/>
-          </a:prstGeom>
-          <a:noFill/>
-        </p:spPr>
-        <p:txBody>
-          <a:bodyPr wrap="none" rtlCol="0">
-            <a:spAutoFit/>
-          </a:bodyPr>
-          <a:lstStyle/>
-          <a:p>
-            <a:r>
-              <a:rPr lang="en-US" sz="1600" dirty="0" smtClean="0"/>
-              <a:t>Queries:</a:t>
-            </a:r>
-            <a:r>
-              <a:rPr lang="en-US" sz="1400" dirty="0"/>
-              <a:t/>
-            </a:r>
-            <a:br>
-              <a:rPr lang="en-US" sz="1400" dirty="0"/>
-            </a:br>
-            <a:r>
-              <a:rPr lang="en-US" sz="1400" dirty="0" smtClean="0"/>
-              <a:t>suites, statistics,</a:t>
-            </a:r>
-            <a:br>
-              <a:rPr lang="en-US" sz="1400" dirty="0" smtClean="0"/>
-            </a:br>
-            <a:r>
-              <a:rPr lang="en-US" sz="1400" dirty="0" smtClean="0"/>
-              <a:t>analyses…</a:t>
-            </a:r>
-            <a:endParaRPr lang="en-US" sz="1600" dirty="0" smtClean="0"/>
-          </a:p>
-        </p:txBody>
-      </p:sp>
       <p:cxnSp>
         <p:nvCxnSpPr>
-          <p:cNvPr id="31" name="Straight Arrow Connector 30"/>
+          <p:cNvPr id="136" name="Straight Arrow Connector 135"/>
           <p:cNvCxnSpPr>
-            <a:stCxn id="6" idx="4"/>
-            <a:endCxn id="40" idx="2"/>
+            <a:stCxn id="127" idx="2"/>
           </p:cNvCxnSpPr>
           <p:nvPr/>
         </p:nvCxnSpPr>
         <p:spPr>
-          <a:xfrm rot="16200000" flipH="1">
-            <a:off x="6372887" y="3553487"/>
-            <a:ext cx="152400" cy="1884626"/>
+          <a:xfrm flipH="1">
+            <a:off x="5029200" y="539750"/>
+            <a:ext cx="479425" cy="603250"/>
           </a:xfrm>
           <a:prstGeom prst="straightConnector1">
             <a:avLst/>
@@ -4150,13 +4112,13 @@
           </a:ln>
         </p:spPr>
         <p:style>
-          <a:lnRef idx="1">
+          <a:lnRef idx="2">
             <a:schemeClr val="accent1"/>
           </a:lnRef>
           <a:fillRef idx="0">
             <a:schemeClr val="accent1"/>
           </a:fillRef>
-          <a:effectRef idx="0">
+          <a:effectRef idx="1">
             <a:schemeClr val="accent1"/>
           </a:effectRef>
           <a:fontRef idx="minor">
@@ -4164,127 +4126,33 @@
           </a:fontRef>
         </p:style>
       </p:cxnSp>
-      <p:sp>
-        <p:nvSpPr>
-          <p:cNvPr id="40" name="Oval 39"/>
-          <p:cNvSpPr/>
-          <p:nvPr/>
-        </p:nvSpPr>
-        <p:spPr>
-          <a:xfrm>
-            <a:off x="7391400" y="4191000"/>
-            <a:ext cx="1676400" cy="762000"/>
-          </a:xfrm>
-          <a:prstGeom prst="ellipse">
-            <a:avLst/>
-          </a:prstGeom>
-          <a:solidFill>
-            <a:srgbClr val="002060"/>
-          </a:solidFill>
-        </p:spPr>
-        <p:style>
-          <a:lnRef idx="2">
-            <a:schemeClr val="accent1">
-              <a:shade val="50000"/>
-            </a:schemeClr>
-          </a:lnRef>
-          <a:fillRef idx="1">
-            <a:schemeClr val="accent1"/>
-          </a:fillRef>
-          <a:effectRef idx="0">
-            <a:schemeClr val="accent1"/>
-          </a:effectRef>
-          <a:fontRef idx="minor">
-            <a:schemeClr val="lt1"/>
-          </a:fontRef>
-        </p:style>
-        <p:txBody>
-          <a:bodyPr rtlCol="0" anchor="ctr"/>
-          <a:lstStyle/>
-          <a:p>
-            <a:pPr algn="ctr"/>
-            <a:r>
-              <a:rPr lang="en-US" sz="1400" dirty="0" smtClean="0"/>
-              <a:t>Test statistics</a:t>
-            </a:r>
-          </a:p>
-        </p:txBody>
-      </p:sp>
-      <p:sp>
-        <p:nvSpPr>
-          <p:cNvPr id="46" name="Oval 45"/>
-          <p:cNvSpPr/>
-          <p:nvPr/>
-        </p:nvSpPr>
-        <p:spPr>
-          <a:xfrm>
-            <a:off x="7162800" y="4724400"/>
-            <a:ext cx="1905000" cy="762000"/>
-          </a:xfrm>
-          <a:prstGeom prst="ellipse">
-            <a:avLst/>
-          </a:prstGeom>
-          <a:solidFill>
-            <a:srgbClr val="002060"/>
-          </a:solidFill>
-        </p:spPr>
-        <p:style>
-          <a:lnRef idx="2">
-            <a:schemeClr val="accent1">
-              <a:shade val="50000"/>
-            </a:schemeClr>
-          </a:lnRef>
-          <a:fillRef idx="1">
-            <a:schemeClr val="accent1"/>
-          </a:fillRef>
-          <a:effectRef idx="0">
-            <a:schemeClr val="accent1"/>
-          </a:effectRef>
-          <a:fontRef idx="minor">
-            <a:schemeClr val="lt1"/>
-          </a:fontRef>
-        </p:style>
-        <p:txBody>
-          <a:bodyPr rtlCol="0" anchor="ctr"/>
-          <a:lstStyle/>
-          <a:p>
-            <a:pPr algn="ctr"/>
-            <a:r>
-              <a:rPr lang="en-US" sz="1400" dirty="0" smtClean="0"/>
-              <a:t>Fault localization</a:t>
-            </a:r>
-          </a:p>
-        </p:txBody>
-      </p:sp>
       <p:cxnSp>
         <p:nvCxnSpPr>
-          <p:cNvPr id="47" name="Straight Arrow Connector 46"/>
-          <p:cNvCxnSpPr>
-            <a:stCxn id="6" idx="4"/>
-            <a:endCxn id="46" idx="2"/>
-          </p:cNvCxnSpPr>
+          <p:cNvPr id="156" name="Straight Arrow Connector 155"/>
+          <p:cNvCxnSpPr/>
           <p:nvPr/>
         </p:nvCxnSpPr>
         <p:spPr>
-          <a:xfrm rot="16200000" flipH="1">
-            <a:off x="5991887" y="3934487"/>
-            <a:ext cx="685800" cy="1656026"/>
+          <a:xfrm flipH="1">
+            <a:off x="2971800" y="1600200"/>
+            <a:ext cx="3505200" cy="3048000"/>
           </a:xfrm>
           <a:prstGeom prst="straightConnector1">
             <a:avLst/>
           </a:prstGeom>
           <a:ln>
+            <a:headEnd type="triangle"/>
             <a:tailEnd type="arrow"/>
           </a:ln>
         </p:spPr>
         <p:style>
-          <a:lnRef idx="1">
+          <a:lnRef idx="2">
             <a:schemeClr val="accent1"/>
           </a:lnRef>
           <a:fillRef idx="0">
             <a:schemeClr val="accent1"/>
           </a:fillRef>
-          <a:effectRef idx="0">
+          <a:effectRef idx="1">
             <a:schemeClr val="accent1"/>
           </a:effectRef>
           <a:fontRef idx="minor">
@@ -4292,7 +4160,281 @@
           </a:fontRef>
         </p:style>
       </p:cxnSp>
+      <p:cxnSp>
+        <p:nvCxnSpPr>
+          <p:cNvPr id="1060" name="Straight Arrow Connector 1059"/>
+          <p:cNvCxnSpPr/>
+          <p:nvPr/>
+        </p:nvCxnSpPr>
+        <p:spPr>
+          <a:xfrm flipH="1">
+            <a:off x="3048000" y="3048000"/>
+            <a:ext cx="3352800" cy="1828800"/>
+          </a:xfrm>
+          <a:prstGeom prst="straightConnector1">
+            <a:avLst/>
+          </a:prstGeom>
+          <a:ln>
+            <a:headEnd type="triangle"/>
+            <a:tailEnd type="arrow"/>
+          </a:ln>
+        </p:spPr>
+        <p:style>
+          <a:lnRef idx="2">
+            <a:schemeClr val="accent1"/>
+          </a:lnRef>
+          <a:fillRef idx="0">
+            <a:schemeClr val="accent1"/>
+          </a:fillRef>
+          <a:effectRef idx="1">
+            <a:schemeClr val="accent1"/>
+          </a:effectRef>
+          <a:fontRef idx="minor">
+            <a:schemeClr val="tx1"/>
+          </a:fontRef>
+        </p:style>
+      </p:cxnSp>
+      <p:cxnSp>
+        <p:nvCxnSpPr>
+          <p:cNvPr id="1062" name="Straight Arrow Connector 1061"/>
+          <p:cNvCxnSpPr/>
+          <p:nvPr/>
+        </p:nvCxnSpPr>
+        <p:spPr>
+          <a:xfrm flipH="1">
+            <a:off x="3124200" y="4267200"/>
+            <a:ext cx="3276600" cy="762000"/>
+          </a:xfrm>
+          <a:prstGeom prst="straightConnector1">
+            <a:avLst/>
+          </a:prstGeom>
+          <a:ln>
+            <a:headEnd type="triangle"/>
+            <a:tailEnd type="arrow"/>
+          </a:ln>
+        </p:spPr>
+        <p:style>
+          <a:lnRef idx="2">
+            <a:schemeClr val="accent1"/>
+          </a:lnRef>
+          <a:fillRef idx="0">
+            <a:schemeClr val="accent1"/>
+          </a:fillRef>
+          <a:effectRef idx="1">
+            <a:schemeClr val="accent1"/>
+          </a:effectRef>
+          <a:fontRef idx="minor">
+            <a:schemeClr val="tx1"/>
+          </a:fontRef>
+        </p:style>
+      </p:cxnSp>
+      <p:cxnSp>
+        <p:nvCxnSpPr>
+          <p:cNvPr id="1064" name="Straight Arrow Connector 1063"/>
+          <p:cNvCxnSpPr/>
+          <p:nvPr/>
+        </p:nvCxnSpPr>
+        <p:spPr>
+          <a:xfrm flipH="1" flipV="1">
+            <a:off x="3200400" y="5257800"/>
+            <a:ext cx="3124200" cy="381000"/>
+          </a:xfrm>
+          <a:prstGeom prst="straightConnector1">
+            <a:avLst/>
+          </a:prstGeom>
+          <a:ln>
+            <a:headEnd type="triangle"/>
+            <a:tailEnd type="arrow"/>
+          </a:ln>
+        </p:spPr>
+        <p:style>
+          <a:lnRef idx="2">
+            <a:schemeClr val="accent1"/>
+          </a:lnRef>
+          <a:fillRef idx="0">
+            <a:schemeClr val="accent1"/>
+          </a:fillRef>
+          <a:effectRef idx="1">
+            <a:schemeClr val="accent1"/>
+          </a:effectRef>
+          <a:fontRef idx="minor">
+            <a:schemeClr val="tx1"/>
+          </a:fontRef>
+        </p:style>
+      </p:cxnSp>
+      <p:sp>
+        <p:nvSpPr>
+          <p:cNvPr id="1065" name="TextBox 1064"/>
+          <p:cNvSpPr txBox="1"/>
+          <p:nvPr/>
+        </p:nvSpPr>
+        <p:spPr>
+          <a:xfrm>
+            <a:off x="5029200" y="2057400"/>
+            <a:ext cx="1287532" cy="923330"/>
+          </a:xfrm>
+          <a:prstGeom prst="rect">
+            <a:avLst/>
+          </a:prstGeom>
+          <a:noFill/>
+        </p:spPr>
+        <p:txBody>
+          <a:bodyPr wrap="none" rtlCol="0">
+            <a:spAutoFit/>
+          </a:bodyPr>
+          <a:lstStyle/>
+          <a:p>
+            <a:pPr algn="ctr"/>
+            <a:r>
+              <a:rPr lang="en-US" dirty="0" smtClean="0"/>
+              <a:t>Surviving</a:t>
+            </a:r>
+            <a:br>
+              <a:rPr lang="en-US" dirty="0" smtClean="0"/>
+            </a:br>
+            <a:r>
+              <a:rPr lang="en-US" dirty="0" smtClean="0"/>
+              <a:t>harnesses +</a:t>
+            </a:r>
+          </a:p>
+          <a:p>
+            <a:pPr algn="ctr"/>
+            <a:r>
+              <a:rPr lang="en-US" dirty="0"/>
+              <a:t>k</a:t>
+            </a:r>
+            <a:r>
+              <a:rPr lang="en-US" dirty="0" smtClean="0"/>
+              <a:t>ill rates</a:t>
+            </a:r>
+            <a:endParaRPr lang="en-US" dirty="0"/>
+          </a:p>
+        </p:txBody>
+      </p:sp>
+      <p:sp>
+        <p:nvSpPr>
+          <p:cNvPr id="202" name="TextBox 201"/>
+          <p:cNvSpPr txBox="1"/>
+          <p:nvPr/>
+        </p:nvSpPr>
+        <p:spPr>
+          <a:xfrm>
+            <a:off x="4495800" y="3200400"/>
+            <a:ext cx="1788658" cy="923330"/>
+          </a:xfrm>
+          <a:prstGeom prst="rect">
+            <a:avLst/>
+          </a:prstGeom>
+          <a:noFill/>
+        </p:spPr>
+        <p:txBody>
+          <a:bodyPr wrap="none" rtlCol="0">
+            <a:spAutoFit/>
+          </a:bodyPr>
+          <a:lstStyle/>
+          <a:p>
+            <a:pPr algn="ctr"/>
+            <a:r>
+              <a:rPr lang="en-US" dirty="0" smtClean="0"/>
+              <a:t>Witness  trace</a:t>
+            </a:r>
+            <a:br>
+              <a:rPr lang="en-US" dirty="0" smtClean="0"/>
+            </a:br>
+            <a:r>
+              <a:rPr lang="en-US" dirty="0" smtClean="0"/>
+              <a:t>(how mutant can</a:t>
+            </a:r>
+            <a:br>
+              <a:rPr lang="en-US" dirty="0" smtClean="0"/>
+            </a:br>
+            <a:r>
+              <a:rPr lang="en-US" dirty="0" smtClean="0"/>
+              <a:t>pass harness)</a:t>
+            </a:r>
+            <a:endParaRPr lang="en-US" dirty="0"/>
+          </a:p>
+        </p:txBody>
+      </p:sp>
+      <p:sp>
+        <p:nvSpPr>
+          <p:cNvPr id="203" name="TextBox 202"/>
+          <p:cNvSpPr txBox="1"/>
+          <p:nvPr/>
+        </p:nvSpPr>
+        <p:spPr>
+          <a:xfrm>
+            <a:off x="4386071" y="4258270"/>
+            <a:ext cx="1855721" cy="646331"/>
+          </a:xfrm>
+          <a:prstGeom prst="rect">
+            <a:avLst/>
+          </a:prstGeom>
+          <a:noFill/>
+        </p:spPr>
+        <p:txBody>
+          <a:bodyPr wrap="none" rtlCol="0">
+            <a:spAutoFit/>
+          </a:bodyPr>
+          <a:lstStyle/>
+          <a:p>
+            <a:pPr algn="ctr"/>
+            <a:r>
+              <a:rPr lang="en-US" dirty="0" smtClean="0"/>
+              <a:t>Stable size +</a:t>
+            </a:r>
+          </a:p>
+          <a:p>
+            <a:pPr algn="ctr"/>
+            <a:r>
+              <a:rPr lang="en-US" dirty="0"/>
+              <a:t>s</a:t>
+            </a:r>
+            <a:r>
+              <a:rPr lang="en-US" dirty="0" smtClean="0"/>
+              <a:t>urviving mutants</a:t>
+            </a:r>
+            <a:endParaRPr lang="en-US" dirty="0"/>
+          </a:p>
+        </p:txBody>
+      </p:sp>
+      <p:sp>
+        <p:nvSpPr>
+          <p:cNvPr id="204" name="TextBox 203"/>
+          <p:cNvSpPr txBox="1"/>
+          <p:nvPr/>
+        </p:nvSpPr>
+        <p:spPr>
+          <a:xfrm>
+            <a:off x="4114800" y="5486400"/>
+            <a:ext cx="1871501" cy="369332"/>
+          </a:xfrm>
+          <a:prstGeom prst="rect">
+            <a:avLst/>
+          </a:prstGeom>
+          <a:noFill/>
+        </p:spPr>
+        <p:txBody>
+          <a:bodyPr wrap="none" rtlCol="0">
+            <a:spAutoFit/>
+          </a:bodyPr>
+          <a:lstStyle/>
+          <a:p>
+            <a:pPr algn="ctr"/>
+            <a:r>
+              <a:rPr lang="en-US" dirty="0" smtClean="0"/>
+              <a:t>Surviving mutants</a:t>
+            </a:r>
+            <a:endParaRPr lang="en-US" dirty="0"/>
+          </a:p>
+        </p:txBody>
+      </p:sp>
     </p:spTree>
+    <p:extLst>
+      <p:ext uri="{BB962C8B-B14F-4D97-AF65-F5344CB8AC3E}">
+        <p14:creationId xmlns:p14="http://schemas.microsoft.com/office/powerpoint/2010/main" val="541537913"/>
+      </p:ext>
+    </p:extLst>
   </p:cSld>
   <p:clrMapOvr>
     <a:masterClrMapping/>
@@ -4300,7 +4442,7 @@
   <p:timing>
     <p:tnLst>
       <p:par>
-        <p:cTn id="1" dur="indefinite" restart="never" nodeType="tmRoot"/>
+        <p:cTn xmlns:p14="http://schemas.microsoft.com/office/powerpoint/2010/main" id="1" dur="indefinite" restart="never" nodeType="tmRoot"/>
       </p:par>
     </p:tnLst>
   </p:timing>

</xml_diff>